<commit_message>
Harmonize non-hyphen spelling of "IT Security"
</commit_message>
<xml_diff>
--- a/slides/S1-E0_Introduction.pptx
+++ b/slides/S1-E0_Introduction.pptx
@@ -3351,9 +3351,10 @@
           <a:lstStyle/>
           <a:p>
             <a:r>
-              <a:rPr lang="de-DE" dirty="0"/>
-              <a:t>IT-Security</a:t>
-            </a:r>
+              <a:rPr lang="de-DE"/>
+              <a:t>IT Security</a:t>
+            </a:r>
+            <a:endParaRPr lang="de-DE" dirty="0"/>
           </a:p>
         </p:txBody>
       </p:sp>

</xml_diff>